<commit_message>
2017 Fix to date in powerpoint
</commit_message>
<xml_diff>
--- a/DesktopBasic0Introduction/Introduction.pptx
+++ b/DesktopBasic0Introduction/Introduction.pptx
@@ -17,14 +17,14 @@
   <p:notesSz cx="6858000" cy="9144000"/>
   <p:embeddedFontLst>
     <p:embeddedFont>
-      <p:font typeface="Proxima Nova" panose="020B0604020202020204" charset="0"/>
+      <p:font typeface="Open Sans" panose="020B0604020202020204" charset="0"/>
       <p:regular r:id="rId7"/>
       <p:bold r:id="rId8"/>
       <p:italic r:id="rId9"/>
       <p:boldItalic r:id="rId10"/>
     </p:embeddedFont>
     <p:embeddedFont>
-      <p:font typeface="Open Sans" panose="020B0604020202020204" charset="0"/>
+      <p:font typeface="Proxima Nova" panose="020B0604020202020204" charset="0"/>
       <p:regular r:id="rId11"/>
       <p:bold r:id="rId12"/>
       <p:italic r:id="rId13"/>
@@ -244,7 +244,7 @@
   </p:defaultTextStyle>
   <p:extLst>
     <p:ext uri="{EFAFB233-063F-42B5-8137-9DF3F51BA10A}">
-      <p15:sldGuideLst xmlns:p15="http://schemas.microsoft.com/office/powerpoint/2012/main" xmlns=""/>
+      <p15:sldGuideLst xmlns="" xmlns:p15="http://schemas.microsoft.com/office/powerpoint/2012/main"/>
     </p:ext>
   </p:extLst>
 </p:presentation>
@@ -5210,7 +5210,15 @@
             </a:pPr>
             <a:r>
               <a:rPr lang="en" sz="6000" dirty="0" smtClean="0"/>
-              <a:t>FME 2016 Training</a:t>
+              <a:t>FME </a:t>
+            </a:r>
+            <a:r>
+              <a:rPr lang="en" sz="6000" dirty="0" smtClean="0"/>
+              <a:t>2017 </a:t>
+            </a:r>
+            <a:r>
+              <a:rPr lang="en" sz="6000" dirty="0" smtClean="0"/>
+              <a:t>Training</a:t>
             </a:r>
             <a:endParaRPr lang="en" sz="6000" dirty="0"/>
           </a:p>

</xml_diff>

<commit_message>
2017 ppt fixes. Added course outlines. Updated WhatsNew
</commit_message>
<xml_diff>
--- a/DesktopBasic0Introduction/Introduction.pptx
+++ b/DesktopBasic0Introduction/Introduction.pptx
@@ -244,7 +244,7 @@
   </p:defaultTextStyle>
   <p:extLst>
     <p:ext uri="{EFAFB233-063F-42B5-8137-9DF3F51BA10A}">
-      <p15:sldGuideLst xmlns="" xmlns:p15="http://schemas.microsoft.com/office/powerpoint/2012/main"/>
+      <p15:sldGuideLst xmlns:p15="http://schemas.microsoft.com/office/powerpoint/2012/main" xmlns=""/>
     </p:ext>
   </p:extLst>
 </p:presentation>
@@ -5210,17 +5210,20 @@
             </a:pPr>
             <a:r>
               <a:rPr lang="en" sz="6000" dirty="0" smtClean="0"/>
-              <a:t>FME </a:t>
-            </a:r>
-            <a:r>
-              <a:rPr lang="en" sz="6000" dirty="0" smtClean="0"/>
-              <a:t>2017 </a:t>
+              <a:t>FME 2017 </a:t>
             </a:r>
             <a:r>
               <a:rPr lang="en" sz="6000" dirty="0" smtClean="0"/>
               <a:t>Training</a:t>
             </a:r>
-            <a:endParaRPr lang="en" sz="6000" dirty="0"/>
+            <a:br>
+              <a:rPr lang="en" sz="6000" dirty="0" smtClean="0"/>
+            </a:br>
+            <a:r>
+              <a:rPr lang="en" sz="4000" dirty="0" smtClean="0"/>
+              <a:t>FME Desktop Basic</a:t>
+            </a:r>
+            <a:endParaRPr lang="en" sz="4000" dirty="0"/>
           </a:p>
         </p:txBody>
       </p:sp>

</xml_diff>